<commit_message>
Update Docs und Presentation
</commit_message>
<xml_diff>
--- a/doc/Presentation.pptx
+++ b/doc/Presentation.pptx
@@ -7447,11 +7447,43 @@
             <a:endParaRPr lang="de-CH" dirty="0"/>
           </a:p>
           <a:p>
+            <a:r>
+              <a:rPr lang="de-CH" dirty="0" err="1"/>
+              <a:t>AttributeSelection</a:t>
+            </a:r>
+            <a:endParaRPr lang="de-CH" dirty="0"/>
+          </a:p>
+          <a:p>
             <a:pPr lvl="1"/>
             <a:r>
+              <a:rPr lang="de-CH" dirty="0" err="1"/>
+              <a:t>Evaluator</a:t>
+            </a:r>
+            <a:r>
               <a:rPr lang="de-CH" dirty="0"/>
-              <a:t>Features (Wörter im Text)</a:t>
-            </a:r>
+              <a:t>: </a:t>
+            </a:r>
+            <a:r>
+              <a:rPr lang="de-CH" dirty="0" err="1"/>
+              <a:t>CfsSubsetEval</a:t>
+            </a:r>
+            <a:endParaRPr lang="de-CH" dirty="0"/>
+          </a:p>
+          <a:p>
+            <a:pPr lvl="1"/>
+            <a:r>
+              <a:rPr lang="de-CH" dirty="0"/>
+              <a:t>Search: </a:t>
+            </a:r>
+            <a:r>
+              <a:rPr lang="de-CH" dirty="0" err="1"/>
+              <a:t>BestFirst</a:t>
+            </a:r>
+            <a:endParaRPr lang="de-CH" dirty="0"/>
+          </a:p>
+          <a:p>
+            <a:pPr lvl="1"/>
+            <a:endParaRPr lang="de-CH" dirty="0"/>
           </a:p>
           <a:p>
             <a:pPr lvl="1"/>
@@ -7654,32 +7686,6 @@
             <a:r>
               <a:rPr lang="de-CH" dirty="0" err="1"/>
               <a:t>BestFirst</a:t>
-            </a:r>
-            <a:endParaRPr lang="de-CH" dirty="0"/>
-          </a:p>
-          <a:p>
-            <a:r>
-              <a:rPr lang="de-CH" dirty="0" err="1"/>
-              <a:t>CrossValidation</a:t>
-            </a:r>
-            <a:r>
-              <a:rPr lang="de-CH" dirty="0"/>
-              <a:t> (10 </a:t>
-            </a:r>
-            <a:r>
-              <a:rPr lang="de-CH" dirty="0" err="1"/>
-              <a:t>Folds</a:t>
-            </a:r>
-            <a:r>
-              <a:rPr lang="de-CH" dirty="0"/>
-              <a:t>)</a:t>
-            </a:r>
-          </a:p>
-          <a:p>
-            <a:pPr lvl="1"/>
-            <a:r>
-              <a:rPr lang="de-CH" dirty="0" err="1"/>
-              <a:t>NaïveBayes</a:t>
             </a:r>
             <a:endParaRPr lang="de-CH" dirty="0"/>
           </a:p>
@@ -11514,6 +11520,31 @@
 </file>
 
 <file path=customXml/item1.xml><?xml version="1.0" encoding="utf-8"?>
+<p:properties xmlns:p="http://schemas.microsoft.com/office/2006/metadata/properties" xmlns:xsi="http://www.w3.org/2001/XMLSchema-instance" xmlns:pc="http://schemas.microsoft.com/office/infopath/2007/PartnerControls">
+  <documentManagement>
+    <BfhIntranetDepartmentText xmlns="f6f68f68-5570-446d-b1e6-2310e70d83d3">
+      <Terms xmlns="http://schemas.microsoft.com/office/infopath/2007/PartnerControls">
+        <TermInfo xmlns="http://schemas.microsoft.com/office/infopath/2007/PartnerControls">
+          <TermName xmlns="http://schemas.microsoft.com/office/infopath/2007/PartnerControls">Vorlage</TermName>
+          <TermId xmlns="http://schemas.microsoft.com/office/infopath/2007/PartnerControls">de1a6d3c-ac6a-4b34-8edd-308eb81066db</TermId>
+        </TermInfo>
+      </Terms>
+    </BfhIntranetDepartmentText>
+    <QMPilot_DokID xmlns="2551ef7e-3b29-44d1-a8ad-ef34c26bfc60">470</QMPilot_DokID>
+  </documentManagement>
+</p:properties>
+</file>
+
+<file path=customXml/item2.xml><?xml version="1.0" encoding="utf-8"?>
+<?mso-contentType ?>
+<FormTemplates xmlns="http://schemas.microsoft.com/sharepoint/v3/contenttype/forms">
+  <Display>DocumentLibraryForm</Display>
+  <Edit>DocumentLibraryForm</Edit>
+  <New>DocumentLibraryForm</New>
+</FormTemplates>
+</file>
+
+<file path=customXml/item3.xml><?xml version="1.0" encoding="utf-8"?>
 <ct:contentTypeSchema xmlns:ct="http://schemas.microsoft.com/office/2006/metadata/contentType" xmlns:ma="http://schemas.microsoft.com/office/2006/metadata/properties/metaAttributes" ct:_="" ma:_="" ma:contentTypeName="QMPilot_ContentType" ma:contentTypeID="0x0101009127C3B567804923A8661E062BBD8EF500AB8983C84EF542A7976DC8547A5CDC52001BD440F45714504284DA526949208683" ma:contentTypeVersion="2" ma:contentTypeDescription="Create a new document." ma:contentTypeScope="" ma:versionID="e95561030a1194bdd1903eaf06697dcb">
   <xsd:schema xmlns:xsd="http://www.w3.org/2001/XMLSchema" xmlns:xs="http://www.w3.org/2001/XMLSchema" xmlns:p="http://schemas.microsoft.com/office/2006/metadata/properties" xmlns:ns2="f6f68f68-5570-446d-b1e6-2310e70d83d3" xmlns:ns3="2551ef7e-3b29-44d1-a8ad-ef34c26bfc60" targetNamespace="http://schemas.microsoft.com/office/2006/metadata/properties" ma:root="true" ma:fieldsID="a12ba8f3cc9838c64a8c8804efb93033" ns2:_="" ns3:_="">
     <xsd:import namespace="f6f68f68-5570-446d-b1e6-2310e70d83d3"/>
@@ -11652,32 +11683,32 @@
 </ct:contentTypeSchema>
 </file>
 
-<file path=customXml/item2.xml><?xml version="1.0" encoding="utf-8"?>
-<?mso-contentType ?>
-<FormTemplates xmlns="http://schemas.microsoft.com/sharepoint/v3/contenttype/forms">
-  <Display>DocumentLibraryForm</Display>
-  <Edit>DocumentLibraryForm</Edit>
-  <New>DocumentLibraryForm</New>
-</FormTemplates>
+<file path=customXml/itemProps1.xml><?xml version="1.0" encoding="utf-8"?>
+<ds:datastoreItem xmlns:ds="http://schemas.openxmlformats.org/officeDocument/2006/customXml" ds:itemID="{C1D1D06F-7B50-4C4E-BDC2-45B577355489}">
+  <ds:schemaRefs>
+    <ds:schemaRef ds:uri="http://purl.org/dc/dcmitype/"/>
+    <ds:schemaRef ds:uri="http://schemas.microsoft.com/office/2006/metadata/properties"/>
+    <ds:schemaRef ds:uri="http://schemas.openxmlformats.org/package/2006/metadata/core-properties"/>
+    <ds:schemaRef ds:uri="http://www.w3.org/XML/1998/namespace"/>
+    <ds:schemaRef ds:uri="2551ef7e-3b29-44d1-a8ad-ef34c26bfc60"/>
+    <ds:schemaRef ds:uri="http://purl.org/dc/elements/1.1/"/>
+    <ds:schemaRef ds:uri="http://schemas.microsoft.com/office/2006/documentManagement/types"/>
+    <ds:schemaRef ds:uri="http://schemas.microsoft.com/office/infopath/2007/PartnerControls"/>
+    <ds:schemaRef ds:uri="f6f68f68-5570-446d-b1e6-2310e70d83d3"/>
+    <ds:schemaRef ds:uri="http://purl.org/dc/terms/"/>
+  </ds:schemaRefs>
+</ds:datastoreItem>
 </file>
 
-<file path=customXml/item3.xml><?xml version="1.0" encoding="utf-8"?>
-<p:properties xmlns:p="http://schemas.microsoft.com/office/2006/metadata/properties" xmlns:xsi="http://www.w3.org/2001/XMLSchema-instance" xmlns:pc="http://schemas.microsoft.com/office/infopath/2007/PartnerControls">
-  <documentManagement>
-    <BfhIntranetDepartmentText xmlns="f6f68f68-5570-446d-b1e6-2310e70d83d3">
-      <Terms xmlns="http://schemas.microsoft.com/office/infopath/2007/PartnerControls">
-        <TermInfo xmlns="http://schemas.microsoft.com/office/infopath/2007/PartnerControls">
-          <TermName xmlns="http://schemas.microsoft.com/office/infopath/2007/PartnerControls">Vorlage</TermName>
-          <TermId xmlns="http://schemas.microsoft.com/office/infopath/2007/PartnerControls">de1a6d3c-ac6a-4b34-8edd-308eb81066db</TermId>
-        </TermInfo>
-      </Terms>
-    </BfhIntranetDepartmentText>
-    <QMPilot_DokID xmlns="2551ef7e-3b29-44d1-a8ad-ef34c26bfc60">470</QMPilot_DokID>
-  </documentManagement>
-</p:properties>
+<file path=customXml/itemProps2.xml><?xml version="1.0" encoding="utf-8"?>
+<ds:datastoreItem xmlns:ds="http://schemas.openxmlformats.org/officeDocument/2006/customXml" ds:itemID="{3B108660-2CB9-4BF5-8E68-68C91CE7D9D8}">
+  <ds:schemaRefs>
+    <ds:schemaRef ds:uri="http://schemas.microsoft.com/sharepoint/v3/contenttype/forms"/>
+  </ds:schemaRefs>
+</ds:datastoreItem>
 </file>
 
-<file path=customXml/itemProps1.xml><?xml version="1.0" encoding="utf-8"?>
+<file path=customXml/itemProps3.xml><?xml version="1.0" encoding="utf-8"?>
 <ds:datastoreItem xmlns:ds="http://schemas.openxmlformats.org/officeDocument/2006/customXml" ds:itemID="{17412572-CAAE-4A55-B1F7-111B37F547FD}">
   <ds:schemaRefs>
     <ds:schemaRef ds:uri="http://schemas.microsoft.com/office/2006/metadata/contentType"/>
@@ -11694,29 +11725,4 @@
     <ds:schemaRef ds:uri="http://schemas.microsoft.com/internal/obd"/>
   </ds:schemaRefs>
 </ds:datastoreItem>
-</file>
-
-<file path=customXml/itemProps2.xml><?xml version="1.0" encoding="utf-8"?>
-<ds:datastoreItem xmlns:ds="http://schemas.openxmlformats.org/officeDocument/2006/customXml" ds:itemID="{3B108660-2CB9-4BF5-8E68-68C91CE7D9D8}">
-  <ds:schemaRefs>
-    <ds:schemaRef ds:uri="http://schemas.microsoft.com/sharepoint/v3/contenttype/forms"/>
-  </ds:schemaRefs>
-</ds:datastoreItem>
-</file>
-
-<file path=customXml/itemProps3.xml><?xml version="1.0" encoding="utf-8"?>
-<ds:datastoreItem xmlns:ds="http://schemas.openxmlformats.org/officeDocument/2006/customXml" ds:itemID="{C1D1D06F-7B50-4C4E-BDC2-45B577355489}">
-  <ds:schemaRefs>
-    <ds:schemaRef ds:uri="http://schemas.openxmlformats.org/package/2006/metadata/core-properties"/>
-    <ds:schemaRef ds:uri="http://purl.org/dc/elements/1.1/"/>
-    <ds:schemaRef ds:uri="http://purl.org/dc/terms/"/>
-    <ds:schemaRef ds:uri="http://schemas.microsoft.com/office/2006/documentManagement/types"/>
-    <ds:schemaRef ds:uri="http://www.w3.org/XML/1998/namespace"/>
-    <ds:schemaRef ds:uri="2551ef7e-3b29-44d1-a8ad-ef34c26bfc60"/>
-    <ds:schemaRef ds:uri="f6f68f68-5570-446d-b1e6-2310e70d83d3"/>
-    <ds:schemaRef ds:uri="http://purl.org/dc/dcmitype/"/>
-    <ds:schemaRef ds:uri="http://schemas.microsoft.com/office/infopath/2007/PartnerControls"/>
-    <ds:schemaRef ds:uri="http://schemas.microsoft.com/office/2006/metadata/properties"/>
-  </ds:schemaRefs>
-</ds:datastoreItem>
 </file>
</xml_diff>

<commit_message>
Anpassung Präsentation und Rechtschreibung
</commit_message>
<xml_diff>
--- a/doc/Presentation.pptx
+++ b/doc/Presentation.pptx
@@ -564,6 +564,750 @@
     </a:lvl9pPr>
   </p:notesStyle>
 </p:notesMaster>
+</file>
+
+<file path=ppt/notesSlides/notesSlide1.xml><?xml version="1.0" encoding="utf-8"?>
+<p:notes xmlns:a="http://schemas.openxmlformats.org/drawingml/2006/main" xmlns:r="http://schemas.openxmlformats.org/officeDocument/2006/relationships" xmlns:p="http://schemas.openxmlformats.org/presentationml/2006/main">
+  <p:cSld>
+    <p:spTree>
+      <p:nvGrpSpPr>
+        <p:cNvPr id="1" name=""/>
+        <p:cNvGrpSpPr/>
+        <p:nvPr/>
+      </p:nvGrpSpPr>
+      <p:grpSpPr>
+        <a:xfrm>
+          <a:off x="0" y="0"/>
+          <a:ext cx="0" cy="0"/>
+          <a:chOff x="0" y="0"/>
+          <a:chExt cx="0" cy="0"/>
+        </a:xfrm>
+      </p:grpSpPr>
+      <p:sp>
+        <p:nvSpPr>
+          <p:cNvPr id="2" name="Slide Image Placeholder 1"/>
+          <p:cNvSpPr>
+            <a:spLocks noGrp="1" noRot="1" noChangeAspect="1"/>
+          </p:cNvSpPr>
+          <p:nvPr>
+            <p:ph type="sldImg"/>
+          </p:nvPr>
+        </p:nvSpPr>
+        <p:spPr/>
+      </p:sp>
+      <p:sp>
+        <p:nvSpPr>
+          <p:cNvPr id="3" name="Notes Placeholder 2"/>
+          <p:cNvSpPr>
+            <a:spLocks noGrp="1"/>
+          </p:cNvSpPr>
+          <p:nvPr>
+            <p:ph type="body" idx="1"/>
+          </p:nvPr>
+        </p:nvSpPr>
+        <p:spPr/>
+        <p:txBody>
+          <a:bodyPr/>
+          <a:lstStyle/>
+          <a:p>
+            <a:r>
+              <a:rPr lang="de-CH" dirty="0"/>
+              <a:t>Michael</a:t>
+            </a:r>
+          </a:p>
+        </p:txBody>
+      </p:sp>
+      <p:sp>
+        <p:nvSpPr>
+          <p:cNvPr id="4" name="Slide Number Placeholder 3"/>
+          <p:cNvSpPr>
+            <a:spLocks noGrp="1"/>
+          </p:cNvSpPr>
+          <p:nvPr>
+            <p:ph type="sldNum" sz="quarter" idx="10"/>
+          </p:nvPr>
+        </p:nvSpPr>
+        <p:spPr/>
+        <p:txBody>
+          <a:bodyPr/>
+          <a:lstStyle/>
+          <a:p>
+            <a:pPr>
+              <a:defRPr/>
+            </a:pPr>
+            <a:fld id="{EE3A4D74-8AB3-4782-8193-8B0B8D7F57EA}" type="slidenum">
+              <a:rPr lang="de-CH" smtClean="0"/>
+              <a:pPr>
+                <a:defRPr/>
+              </a:pPr>
+              <a:t>1</a:t>
+            </a:fld>
+            <a:endParaRPr lang="de-CH"/>
+          </a:p>
+        </p:txBody>
+      </p:sp>
+    </p:spTree>
+    <p:extLst>
+      <p:ext uri="{BB962C8B-B14F-4D97-AF65-F5344CB8AC3E}">
+        <p14:creationId xmlns:p14="http://schemas.microsoft.com/office/powerpoint/2010/main" val="956116664"/>
+      </p:ext>
+    </p:extLst>
+  </p:cSld>
+  <p:clrMapOvr>
+    <a:masterClrMapping/>
+  </p:clrMapOvr>
+</p:notes>
+</file>
+
+<file path=ppt/notesSlides/notesSlide2.xml><?xml version="1.0" encoding="utf-8"?>
+<p:notes xmlns:a="http://schemas.openxmlformats.org/drawingml/2006/main" xmlns:r="http://schemas.openxmlformats.org/officeDocument/2006/relationships" xmlns:p="http://schemas.openxmlformats.org/presentationml/2006/main">
+  <p:cSld>
+    <p:spTree>
+      <p:nvGrpSpPr>
+        <p:cNvPr id="1" name=""/>
+        <p:cNvGrpSpPr/>
+        <p:nvPr/>
+      </p:nvGrpSpPr>
+      <p:grpSpPr>
+        <a:xfrm>
+          <a:off x="0" y="0"/>
+          <a:ext cx="0" cy="0"/>
+          <a:chOff x="0" y="0"/>
+          <a:chExt cx="0" cy="0"/>
+        </a:xfrm>
+      </p:grpSpPr>
+      <p:sp>
+        <p:nvSpPr>
+          <p:cNvPr id="2" name="Slide Image Placeholder 1"/>
+          <p:cNvSpPr>
+            <a:spLocks noGrp="1" noRot="1" noChangeAspect="1"/>
+          </p:cNvSpPr>
+          <p:nvPr>
+            <p:ph type="sldImg"/>
+          </p:nvPr>
+        </p:nvSpPr>
+        <p:spPr/>
+      </p:sp>
+      <p:sp>
+        <p:nvSpPr>
+          <p:cNvPr id="3" name="Notes Placeholder 2"/>
+          <p:cNvSpPr>
+            <a:spLocks noGrp="1"/>
+          </p:cNvSpPr>
+          <p:nvPr>
+            <p:ph type="body" idx="1"/>
+          </p:nvPr>
+        </p:nvSpPr>
+        <p:spPr/>
+        <p:txBody>
+          <a:bodyPr/>
+          <a:lstStyle/>
+          <a:p>
+            <a:r>
+              <a:rPr lang="de-CH" dirty="0"/>
+              <a:t>Michael</a:t>
+            </a:r>
+          </a:p>
+        </p:txBody>
+      </p:sp>
+      <p:sp>
+        <p:nvSpPr>
+          <p:cNvPr id="4" name="Slide Number Placeholder 3"/>
+          <p:cNvSpPr>
+            <a:spLocks noGrp="1"/>
+          </p:cNvSpPr>
+          <p:nvPr>
+            <p:ph type="sldNum" sz="quarter" idx="10"/>
+          </p:nvPr>
+        </p:nvSpPr>
+        <p:spPr/>
+        <p:txBody>
+          <a:bodyPr/>
+          <a:lstStyle/>
+          <a:p>
+            <a:pPr>
+              <a:defRPr/>
+            </a:pPr>
+            <a:fld id="{EE3A4D74-8AB3-4782-8193-8B0B8D7F57EA}" type="slidenum">
+              <a:rPr lang="de-CH" smtClean="0"/>
+              <a:pPr>
+                <a:defRPr/>
+              </a:pPr>
+              <a:t>2</a:t>
+            </a:fld>
+            <a:endParaRPr lang="de-CH"/>
+          </a:p>
+        </p:txBody>
+      </p:sp>
+    </p:spTree>
+    <p:extLst>
+      <p:ext uri="{BB962C8B-B14F-4D97-AF65-F5344CB8AC3E}">
+        <p14:creationId xmlns:p14="http://schemas.microsoft.com/office/powerpoint/2010/main" val="1527630146"/>
+      </p:ext>
+    </p:extLst>
+  </p:cSld>
+  <p:clrMapOvr>
+    <a:masterClrMapping/>
+  </p:clrMapOvr>
+</p:notes>
+</file>
+
+<file path=ppt/notesSlides/notesSlide3.xml><?xml version="1.0" encoding="utf-8"?>
+<p:notes xmlns:a="http://schemas.openxmlformats.org/drawingml/2006/main" xmlns:r="http://schemas.openxmlformats.org/officeDocument/2006/relationships" xmlns:p="http://schemas.openxmlformats.org/presentationml/2006/main">
+  <p:cSld>
+    <p:spTree>
+      <p:nvGrpSpPr>
+        <p:cNvPr id="1" name=""/>
+        <p:cNvGrpSpPr/>
+        <p:nvPr/>
+      </p:nvGrpSpPr>
+      <p:grpSpPr>
+        <a:xfrm>
+          <a:off x="0" y="0"/>
+          <a:ext cx="0" cy="0"/>
+          <a:chOff x="0" y="0"/>
+          <a:chExt cx="0" cy="0"/>
+        </a:xfrm>
+      </p:grpSpPr>
+      <p:sp>
+        <p:nvSpPr>
+          <p:cNvPr id="2" name="Slide Image Placeholder 1"/>
+          <p:cNvSpPr>
+            <a:spLocks noGrp="1" noRot="1" noChangeAspect="1"/>
+          </p:cNvSpPr>
+          <p:nvPr>
+            <p:ph type="sldImg"/>
+          </p:nvPr>
+        </p:nvSpPr>
+        <p:spPr/>
+      </p:sp>
+      <p:sp>
+        <p:nvSpPr>
+          <p:cNvPr id="3" name="Notes Placeholder 2"/>
+          <p:cNvSpPr>
+            <a:spLocks noGrp="1"/>
+          </p:cNvSpPr>
+          <p:nvPr>
+            <p:ph type="body" idx="1"/>
+          </p:nvPr>
+        </p:nvSpPr>
+        <p:spPr/>
+        <p:txBody>
+          <a:bodyPr/>
+          <a:lstStyle/>
+          <a:p>
+            <a:r>
+              <a:rPr lang="de-CH" dirty="0"/>
+              <a:t>Alex</a:t>
+            </a:r>
+          </a:p>
+        </p:txBody>
+      </p:sp>
+      <p:sp>
+        <p:nvSpPr>
+          <p:cNvPr id="4" name="Slide Number Placeholder 3"/>
+          <p:cNvSpPr>
+            <a:spLocks noGrp="1"/>
+          </p:cNvSpPr>
+          <p:nvPr>
+            <p:ph type="sldNum" sz="quarter" idx="10"/>
+          </p:nvPr>
+        </p:nvSpPr>
+        <p:spPr/>
+        <p:txBody>
+          <a:bodyPr/>
+          <a:lstStyle/>
+          <a:p>
+            <a:pPr>
+              <a:defRPr/>
+            </a:pPr>
+            <a:fld id="{EE3A4D74-8AB3-4782-8193-8B0B8D7F57EA}" type="slidenum">
+              <a:rPr lang="de-CH" smtClean="0"/>
+              <a:pPr>
+                <a:defRPr/>
+              </a:pPr>
+              <a:t>3</a:t>
+            </a:fld>
+            <a:endParaRPr lang="de-CH"/>
+          </a:p>
+        </p:txBody>
+      </p:sp>
+    </p:spTree>
+    <p:extLst>
+      <p:ext uri="{BB962C8B-B14F-4D97-AF65-F5344CB8AC3E}">
+        <p14:creationId xmlns:p14="http://schemas.microsoft.com/office/powerpoint/2010/main" val="4214647489"/>
+      </p:ext>
+    </p:extLst>
+  </p:cSld>
+  <p:clrMapOvr>
+    <a:masterClrMapping/>
+  </p:clrMapOvr>
+</p:notes>
+</file>
+
+<file path=ppt/notesSlides/notesSlide4.xml><?xml version="1.0" encoding="utf-8"?>
+<p:notes xmlns:a="http://schemas.openxmlformats.org/drawingml/2006/main" xmlns:r="http://schemas.openxmlformats.org/officeDocument/2006/relationships" xmlns:p="http://schemas.openxmlformats.org/presentationml/2006/main">
+  <p:cSld>
+    <p:spTree>
+      <p:nvGrpSpPr>
+        <p:cNvPr id="1" name=""/>
+        <p:cNvGrpSpPr/>
+        <p:nvPr/>
+      </p:nvGrpSpPr>
+      <p:grpSpPr>
+        <a:xfrm>
+          <a:off x="0" y="0"/>
+          <a:ext cx="0" cy="0"/>
+          <a:chOff x="0" y="0"/>
+          <a:chExt cx="0" cy="0"/>
+        </a:xfrm>
+      </p:grpSpPr>
+      <p:sp>
+        <p:nvSpPr>
+          <p:cNvPr id="2" name="Slide Image Placeholder 1"/>
+          <p:cNvSpPr>
+            <a:spLocks noGrp="1" noRot="1" noChangeAspect="1"/>
+          </p:cNvSpPr>
+          <p:nvPr>
+            <p:ph type="sldImg"/>
+          </p:nvPr>
+        </p:nvSpPr>
+        <p:spPr/>
+      </p:sp>
+      <p:sp>
+        <p:nvSpPr>
+          <p:cNvPr id="3" name="Notes Placeholder 2"/>
+          <p:cNvSpPr>
+            <a:spLocks noGrp="1"/>
+          </p:cNvSpPr>
+          <p:nvPr>
+            <p:ph type="body" idx="1"/>
+          </p:nvPr>
+        </p:nvSpPr>
+        <p:spPr/>
+        <p:txBody>
+          <a:bodyPr/>
+          <a:lstStyle/>
+          <a:p>
+            <a:r>
+              <a:rPr lang="de-CH" dirty="0"/>
+              <a:t>Alex</a:t>
+            </a:r>
+          </a:p>
+        </p:txBody>
+      </p:sp>
+      <p:sp>
+        <p:nvSpPr>
+          <p:cNvPr id="4" name="Slide Number Placeholder 3"/>
+          <p:cNvSpPr>
+            <a:spLocks noGrp="1"/>
+          </p:cNvSpPr>
+          <p:nvPr>
+            <p:ph type="sldNum" sz="quarter" idx="10"/>
+          </p:nvPr>
+        </p:nvSpPr>
+        <p:spPr/>
+        <p:txBody>
+          <a:bodyPr/>
+          <a:lstStyle/>
+          <a:p>
+            <a:pPr>
+              <a:defRPr/>
+            </a:pPr>
+            <a:fld id="{EE3A4D74-8AB3-4782-8193-8B0B8D7F57EA}" type="slidenum">
+              <a:rPr lang="de-CH" smtClean="0"/>
+              <a:pPr>
+                <a:defRPr/>
+              </a:pPr>
+              <a:t>4</a:t>
+            </a:fld>
+            <a:endParaRPr lang="de-CH"/>
+          </a:p>
+        </p:txBody>
+      </p:sp>
+    </p:spTree>
+    <p:extLst>
+      <p:ext uri="{BB962C8B-B14F-4D97-AF65-F5344CB8AC3E}">
+        <p14:creationId xmlns:p14="http://schemas.microsoft.com/office/powerpoint/2010/main" val="2525721220"/>
+      </p:ext>
+    </p:extLst>
+  </p:cSld>
+  <p:clrMapOvr>
+    <a:masterClrMapping/>
+  </p:clrMapOvr>
+</p:notes>
+</file>
+
+<file path=ppt/notesSlides/notesSlide5.xml><?xml version="1.0" encoding="utf-8"?>
+<p:notes xmlns:a="http://schemas.openxmlformats.org/drawingml/2006/main" xmlns:r="http://schemas.openxmlformats.org/officeDocument/2006/relationships" xmlns:p="http://schemas.openxmlformats.org/presentationml/2006/main">
+  <p:cSld>
+    <p:spTree>
+      <p:nvGrpSpPr>
+        <p:cNvPr id="1" name=""/>
+        <p:cNvGrpSpPr/>
+        <p:nvPr/>
+      </p:nvGrpSpPr>
+      <p:grpSpPr>
+        <a:xfrm>
+          <a:off x="0" y="0"/>
+          <a:ext cx="0" cy="0"/>
+          <a:chOff x="0" y="0"/>
+          <a:chExt cx="0" cy="0"/>
+        </a:xfrm>
+      </p:grpSpPr>
+      <p:sp>
+        <p:nvSpPr>
+          <p:cNvPr id="2" name="Slide Image Placeholder 1"/>
+          <p:cNvSpPr>
+            <a:spLocks noGrp="1" noRot="1" noChangeAspect="1"/>
+          </p:cNvSpPr>
+          <p:nvPr>
+            <p:ph type="sldImg"/>
+          </p:nvPr>
+        </p:nvSpPr>
+        <p:spPr/>
+      </p:sp>
+      <p:sp>
+        <p:nvSpPr>
+          <p:cNvPr id="3" name="Notes Placeholder 2"/>
+          <p:cNvSpPr>
+            <a:spLocks noGrp="1"/>
+          </p:cNvSpPr>
+          <p:nvPr>
+            <p:ph type="body" idx="1"/>
+          </p:nvPr>
+        </p:nvSpPr>
+        <p:spPr/>
+        <p:txBody>
+          <a:bodyPr/>
+          <a:lstStyle/>
+          <a:p>
+            <a:r>
+              <a:rPr lang="de-CH" dirty="0"/>
+              <a:t>Nalet</a:t>
+            </a:r>
+          </a:p>
+        </p:txBody>
+      </p:sp>
+      <p:sp>
+        <p:nvSpPr>
+          <p:cNvPr id="4" name="Slide Number Placeholder 3"/>
+          <p:cNvSpPr>
+            <a:spLocks noGrp="1"/>
+          </p:cNvSpPr>
+          <p:nvPr>
+            <p:ph type="sldNum" sz="quarter" idx="10"/>
+          </p:nvPr>
+        </p:nvSpPr>
+        <p:spPr/>
+        <p:txBody>
+          <a:bodyPr/>
+          <a:lstStyle/>
+          <a:p>
+            <a:pPr>
+              <a:defRPr/>
+            </a:pPr>
+            <a:fld id="{EE3A4D74-8AB3-4782-8193-8B0B8D7F57EA}" type="slidenum">
+              <a:rPr lang="de-CH" smtClean="0"/>
+              <a:pPr>
+                <a:defRPr/>
+              </a:pPr>
+              <a:t>5</a:t>
+            </a:fld>
+            <a:endParaRPr lang="de-CH"/>
+          </a:p>
+        </p:txBody>
+      </p:sp>
+    </p:spTree>
+    <p:extLst>
+      <p:ext uri="{BB962C8B-B14F-4D97-AF65-F5344CB8AC3E}">
+        <p14:creationId xmlns:p14="http://schemas.microsoft.com/office/powerpoint/2010/main" val="260764349"/>
+      </p:ext>
+    </p:extLst>
+  </p:cSld>
+  <p:clrMapOvr>
+    <a:masterClrMapping/>
+  </p:clrMapOvr>
+</p:notes>
+</file>
+
+<file path=ppt/notesSlides/notesSlide6.xml><?xml version="1.0" encoding="utf-8"?>
+<p:notes xmlns:a="http://schemas.openxmlformats.org/drawingml/2006/main" xmlns:r="http://schemas.openxmlformats.org/officeDocument/2006/relationships" xmlns:p="http://schemas.openxmlformats.org/presentationml/2006/main">
+  <p:cSld>
+    <p:spTree>
+      <p:nvGrpSpPr>
+        <p:cNvPr id="1" name=""/>
+        <p:cNvGrpSpPr/>
+        <p:nvPr/>
+      </p:nvGrpSpPr>
+      <p:grpSpPr>
+        <a:xfrm>
+          <a:off x="0" y="0"/>
+          <a:ext cx="0" cy="0"/>
+          <a:chOff x="0" y="0"/>
+          <a:chExt cx="0" cy="0"/>
+        </a:xfrm>
+      </p:grpSpPr>
+      <p:sp>
+        <p:nvSpPr>
+          <p:cNvPr id="2" name="Slide Image Placeholder 1"/>
+          <p:cNvSpPr>
+            <a:spLocks noGrp="1" noRot="1" noChangeAspect="1"/>
+          </p:cNvSpPr>
+          <p:nvPr>
+            <p:ph type="sldImg"/>
+          </p:nvPr>
+        </p:nvSpPr>
+        <p:spPr/>
+      </p:sp>
+      <p:sp>
+        <p:nvSpPr>
+          <p:cNvPr id="3" name="Notes Placeholder 2"/>
+          <p:cNvSpPr>
+            <a:spLocks noGrp="1"/>
+          </p:cNvSpPr>
+          <p:nvPr>
+            <p:ph type="body" idx="1"/>
+          </p:nvPr>
+        </p:nvSpPr>
+        <p:spPr/>
+        <p:txBody>
+          <a:bodyPr/>
+          <a:lstStyle/>
+          <a:p>
+            <a:r>
+              <a:rPr lang="de-CH" dirty="0"/>
+              <a:t>Nalet</a:t>
+            </a:r>
+          </a:p>
+        </p:txBody>
+      </p:sp>
+      <p:sp>
+        <p:nvSpPr>
+          <p:cNvPr id="4" name="Slide Number Placeholder 3"/>
+          <p:cNvSpPr>
+            <a:spLocks noGrp="1"/>
+          </p:cNvSpPr>
+          <p:nvPr>
+            <p:ph type="sldNum" sz="quarter" idx="10"/>
+          </p:nvPr>
+        </p:nvSpPr>
+        <p:spPr/>
+        <p:txBody>
+          <a:bodyPr/>
+          <a:lstStyle/>
+          <a:p>
+            <a:pPr>
+              <a:defRPr/>
+            </a:pPr>
+            <a:fld id="{EE3A4D74-8AB3-4782-8193-8B0B8D7F57EA}" type="slidenum">
+              <a:rPr lang="de-CH" smtClean="0"/>
+              <a:pPr>
+                <a:defRPr/>
+              </a:pPr>
+              <a:t>6</a:t>
+            </a:fld>
+            <a:endParaRPr lang="de-CH"/>
+          </a:p>
+        </p:txBody>
+      </p:sp>
+    </p:spTree>
+    <p:extLst>
+      <p:ext uri="{BB962C8B-B14F-4D97-AF65-F5344CB8AC3E}">
+        <p14:creationId xmlns:p14="http://schemas.microsoft.com/office/powerpoint/2010/main" val="1532139701"/>
+      </p:ext>
+    </p:extLst>
+  </p:cSld>
+  <p:clrMapOvr>
+    <a:masterClrMapping/>
+  </p:clrMapOvr>
+</p:notes>
+</file>
+
+<file path=ppt/notesSlides/notesSlide7.xml><?xml version="1.0" encoding="utf-8"?>
+<p:notes xmlns:a="http://schemas.openxmlformats.org/drawingml/2006/main" xmlns:r="http://schemas.openxmlformats.org/officeDocument/2006/relationships" xmlns:p="http://schemas.openxmlformats.org/presentationml/2006/main">
+  <p:cSld>
+    <p:spTree>
+      <p:nvGrpSpPr>
+        <p:cNvPr id="1" name=""/>
+        <p:cNvGrpSpPr/>
+        <p:nvPr/>
+      </p:nvGrpSpPr>
+      <p:grpSpPr>
+        <a:xfrm>
+          <a:off x="0" y="0"/>
+          <a:ext cx="0" cy="0"/>
+          <a:chOff x="0" y="0"/>
+          <a:chExt cx="0" cy="0"/>
+        </a:xfrm>
+      </p:grpSpPr>
+      <p:sp>
+        <p:nvSpPr>
+          <p:cNvPr id="2" name="Slide Image Placeholder 1"/>
+          <p:cNvSpPr>
+            <a:spLocks noGrp="1" noRot="1" noChangeAspect="1"/>
+          </p:cNvSpPr>
+          <p:nvPr>
+            <p:ph type="sldImg"/>
+          </p:nvPr>
+        </p:nvSpPr>
+        <p:spPr/>
+      </p:sp>
+      <p:sp>
+        <p:nvSpPr>
+          <p:cNvPr id="3" name="Notes Placeholder 2"/>
+          <p:cNvSpPr>
+            <a:spLocks noGrp="1"/>
+          </p:cNvSpPr>
+          <p:nvPr>
+            <p:ph type="body" idx="1"/>
+          </p:nvPr>
+        </p:nvSpPr>
+        <p:spPr/>
+        <p:txBody>
+          <a:bodyPr/>
+          <a:lstStyle/>
+          <a:p>
+            <a:r>
+              <a:rPr lang="de-CH" dirty="0"/>
+              <a:t>Nalet</a:t>
+            </a:r>
+          </a:p>
+        </p:txBody>
+      </p:sp>
+      <p:sp>
+        <p:nvSpPr>
+          <p:cNvPr id="4" name="Slide Number Placeholder 3"/>
+          <p:cNvSpPr>
+            <a:spLocks noGrp="1"/>
+          </p:cNvSpPr>
+          <p:nvPr>
+            <p:ph type="sldNum" sz="quarter" idx="10"/>
+          </p:nvPr>
+        </p:nvSpPr>
+        <p:spPr/>
+        <p:txBody>
+          <a:bodyPr/>
+          <a:lstStyle/>
+          <a:p>
+            <a:pPr>
+              <a:defRPr/>
+            </a:pPr>
+            <a:fld id="{EE3A4D74-8AB3-4782-8193-8B0B8D7F57EA}" type="slidenum">
+              <a:rPr lang="de-CH" smtClean="0"/>
+              <a:pPr>
+                <a:defRPr/>
+              </a:pPr>
+              <a:t>7</a:t>
+            </a:fld>
+            <a:endParaRPr lang="de-CH"/>
+          </a:p>
+        </p:txBody>
+      </p:sp>
+    </p:spTree>
+    <p:extLst>
+      <p:ext uri="{BB962C8B-B14F-4D97-AF65-F5344CB8AC3E}">
+        <p14:creationId xmlns:p14="http://schemas.microsoft.com/office/powerpoint/2010/main" val="3680164604"/>
+      </p:ext>
+    </p:extLst>
+  </p:cSld>
+  <p:clrMapOvr>
+    <a:masterClrMapping/>
+  </p:clrMapOvr>
+</p:notes>
+</file>
+
+<file path=ppt/notesSlides/notesSlide8.xml><?xml version="1.0" encoding="utf-8"?>
+<p:notes xmlns:a="http://schemas.openxmlformats.org/drawingml/2006/main" xmlns:r="http://schemas.openxmlformats.org/officeDocument/2006/relationships" xmlns:p="http://schemas.openxmlformats.org/presentationml/2006/main">
+  <p:cSld>
+    <p:spTree>
+      <p:nvGrpSpPr>
+        <p:cNvPr id="1" name=""/>
+        <p:cNvGrpSpPr/>
+        <p:nvPr/>
+      </p:nvGrpSpPr>
+      <p:grpSpPr>
+        <a:xfrm>
+          <a:off x="0" y="0"/>
+          <a:ext cx="0" cy="0"/>
+          <a:chOff x="0" y="0"/>
+          <a:chExt cx="0" cy="0"/>
+        </a:xfrm>
+      </p:grpSpPr>
+      <p:sp>
+        <p:nvSpPr>
+          <p:cNvPr id="2" name="Slide Image Placeholder 1"/>
+          <p:cNvSpPr>
+            <a:spLocks noGrp="1" noRot="1" noChangeAspect="1"/>
+          </p:cNvSpPr>
+          <p:nvPr>
+            <p:ph type="sldImg"/>
+          </p:nvPr>
+        </p:nvSpPr>
+        <p:spPr/>
+      </p:sp>
+      <p:sp>
+        <p:nvSpPr>
+          <p:cNvPr id="3" name="Notes Placeholder 2"/>
+          <p:cNvSpPr>
+            <a:spLocks noGrp="1"/>
+          </p:cNvSpPr>
+          <p:nvPr>
+            <p:ph type="body" idx="1"/>
+          </p:nvPr>
+        </p:nvSpPr>
+        <p:spPr/>
+        <p:txBody>
+          <a:bodyPr/>
+          <a:lstStyle/>
+          <a:p>
+            <a:r>
+              <a:rPr lang="de-CH" dirty="0"/>
+              <a:t>Nalet</a:t>
+            </a:r>
+          </a:p>
+        </p:txBody>
+      </p:sp>
+      <p:sp>
+        <p:nvSpPr>
+          <p:cNvPr id="4" name="Slide Number Placeholder 3"/>
+          <p:cNvSpPr>
+            <a:spLocks noGrp="1"/>
+          </p:cNvSpPr>
+          <p:nvPr>
+            <p:ph type="sldNum" sz="quarter" idx="10"/>
+          </p:nvPr>
+        </p:nvSpPr>
+        <p:spPr/>
+        <p:txBody>
+          <a:bodyPr/>
+          <a:lstStyle/>
+          <a:p>
+            <a:pPr>
+              <a:defRPr/>
+            </a:pPr>
+            <a:fld id="{EE3A4D74-8AB3-4782-8193-8B0B8D7F57EA}" type="slidenum">
+              <a:rPr lang="de-CH" smtClean="0"/>
+              <a:pPr>
+                <a:defRPr/>
+              </a:pPr>
+              <a:t>8</a:t>
+            </a:fld>
+            <a:endParaRPr lang="de-CH"/>
+          </a:p>
+        </p:txBody>
+      </p:sp>
+    </p:spTree>
+    <p:extLst>
+      <p:ext uri="{BB962C8B-B14F-4D97-AF65-F5344CB8AC3E}">
+        <p14:creationId xmlns:p14="http://schemas.microsoft.com/office/powerpoint/2010/main" val="3340279731"/>
+      </p:ext>
+    </p:extLst>
+  </p:cSld>
+  <p:clrMapOvr>
+    <a:masterClrMapping/>
+  </p:clrMapOvr>
+</p:notes>
 </file>
 
 <file path=ppt/slideLayouts/slideLayout1.xml><?xml version="1.0" encoding="utf-8"?>
@@ -6745,7 +7489,7 @@
                 <a:latin typeface="Lucida Sans" pitchFamily="34" charset="0"/>
                 <a:cs typeface="Lucida Sans Unicode" pitchFamily="34" charset="0"/>
               </a:rPr>
-              <a:t>Nalet Meinen, Alexander Nussbaum, Michael Utz</a:t>
+              <a:t>Nalet Meinen, Alexander Nussbaum, Michel Utz</a:t>
             </a:r>
           </a:p>
         </p:txBody>
@@ -11520,31 +12264,6 @@
 </file>
 
 <file path=customXml/item1.xml><?xml version="1.0" encoding="utf-8"?>
-<p:properties xmlns:p="http://schemas.microsoft.com/office/2006/metadata/properties" xmlns:xsi="http://www.w3.org/2001/XMLSchema-instance" xmlns:pc="http://schemas.microsoft.com/office/infopath/2007/PartnerControls">
-  <documentManagement>
-    <BfhIntranetDepartmentText xmlns="f6f68f68-5570-446d-b1e6-2310e70d83d3">
-      <Terms xmlns="http://schemas.microsoft.com/office/infopath/2007/PartnerControls">
-        <TermInfo xmlns="http://schemas.microsoft.com/office/infopath/2007/PartnerControls">
-          <TermName xmlns="http://schemas.microsoft.com/office/infopath/2007/PartnerControls">Vorlage</TermName>
-          <TermId xmlns="http://schemas.microsoft.com/office/infopath/2007/PartnerControls">de1a6d3c-ac6a-4b34-8edd-308eb81066db</TermId>
-        </TermInfo>
-      </Terms>
-    </BfhIntranetDepartmentText>
-    <QMPilot_DokID xmlns="2551ef7e-3b29-44d1-a8ad-ef34c26bfc60">470</QMPilot_DokID>
-  </documentManagement>
-</p:properties>
-</file>
-
-<file path=customXml/item2.xml><?xml version="1.0" encoding="utf-8"?>
-<?mso-contentType ?>
-<FormTemplates xmlns="http://schemas.microsoft.com/sharepoint/v3/contenttype/forms">
-  <Display>DocumentLibraryForm</Display>
-  <Edit>DocumentLibraryForm</Edit>
-  <New>DocumentLibraryForm</New>
-</FormTemplates>
-</file>
-
-<file path=customXml/item3.xml><?xml version="1.0" encoding="utf-8"?>
 <ct:contentTypeSchema xmlns:ct="http://schemas.microsoft.com/office/2006/metadata/contentType" xmlns:ma="http://schemas.microsoft.com/office/2006/metadata/properties/metaAttributes" ct:_="" ma:_="" ma:contentTypeName="QMPilot_ContentType" ma:contentTypeID="0x0101009127C3B567804923A8661E062BBD8EF500AB8983C84EF542A7976DC8547A5CDC52001BD440F45714504284DA526949208683" ma:contentTypeVersion="2" ma:contentTypeDescription="Create a new document." ma:contentTypeScope="" ma:versionID="e95561030a1194bdd1903eaf06697dcb">
   <xsd:schema xmlns:xsd="http://www.w3.org/2001/XMLSchema" xmlns:xs="http://www.w3.org/2001/XMLSchema" xmlns:p="http://schemas.microsoft.com/office/2006/metadata/properties" xmlns:ns2="f6f68f68-5570-446d-b1e6-2310e70d83d3" xmlns:ns3="2551ef7e-3b29-44d1-a8ad-ef34c26bfc60" targetNamespace="http://schemas.microsoft.com/office/2006/metadata/properties" ma:root="true" ma:fieldsID="a12ba8f3cc9838c64a8c8804efb93033" ns2:_="" ns3:_="">
     <xsd:import namespace="f6f68f68-5570-446d-b1e6-2310e70d83d3"/>
@@ -11683,32 +12402,32 @@
 </ct:contentTypeSchema>
 </file>
 
-<file path=customXml/itemProps1.xml><?xml version="1.0" encoding="utf-8"?>
-<ds:datastoreItem xmlns:ds="http://schemas.openxmlformats.org/officeDocument/2006/customXml" ds:itemID="{C1D1D06F-7B50-4C4E-BDC2-45B577355489}">
-  <ds:schemaRefs>
-    <ds:schemaRef ds:uri="http://purl.org/dc/dcmitype/"/>
-    <ds:schemaRef ds:uri="http://schemas.microsoft.com/office/2006/metadata/properties"/>
-    <ds:schemaRef ds:uri="http://schemas.openxmlformats.org/package/2006/metadata/core-properties"/>
-    <ds:schemaRef ds:uri="http://www.w3.org/XML/1998/namespace"/>
-    <ds:schemaRef ds:uri="2551ef7e-3b29-44d1-a8ad-ef34c26bfc60"/>
-    <ds:schemaRef ds:uri="http://purl.org/dc/elements/1.1/"/>
-    <ds:schemaRef ds:uri="http://schemas.microsoft.com/office/2006/documentManagement/types"/>
-    <ds:schemaRef ds:uri="http://schemas.microsoft.com/office/infopath/2007/PartnerControls"/>
-    <ds:schemaRef ds:uri="f6f68f68-5570-446d-b1e6-2310e70d83d3"/>
-    <ds:schemaRef ds:uri="http://purl.org/dc/terms/"/>
-  </ds:schemaRefs>
-</ds:datastoreItem>
+<file path=customXml/item2.xml><?xml version="1.0" encoding="utf-8"?>
+<?mso-contentType ?>
+<FormTemplates xmlns="http://schemas.microsoft.com/sharepoint/v3/contenttype/forms">
+  <Display>DocumentLibraryForm</Display>
+  <Edit>DocumentLibraryForm</Edit>
+  <New>DocumentLibraryForm</New>
+</FormTemplates>
 </file>
 
-<file path=customXml/itemProps2.xml><?xml version="1.0" encoding="utf-8"?>
-<ds:datastoreItem xmlns:ds="http://schemas.openxmlformats.org/officeDocument/2006/customXml" ds:itemID="{3B108660-2CB9-4BF5-8E68-68C91CE7D9D8}">
-  <ds:schemaRefs>
-    <ds:schemaRef ds:uri="http://schemas.microsoft.com/sharepoint/v3/contenttype/forms"/>
-  </ds:schemaRefs>
-</ds:datastoreItem>
+<file path=customXml/item3.xml><?xml version="1.0" encoding="utf-8"?>
+<p:properties xmlns:p="http://schemas.microsoft.com/office/2006/metadata/properties" xmlns:xsi="http://www.w3.org/2001/XMLSchema-instance" xmlns:pc="http://schemas.microsoft.com/office/infopath/2007/PartnerControls">
+  <documentManagement>
+    <BfhIntranetDepartmentText xmlns="f6f68f68-5570-446d-b1e6-2310e70d83d3">
+      <Terms xmlns="http://schemas.microsoft.com/office/infopath/2007/PartnerControls">
+        <TermInfo xmlns="http://schemas.microsoft.com/office/infopath/2007/PartnerControls">
+          <TermName xmlns="http://schemas.microsoft.com/office/infopath/2007/PartnerControls">Vorlage</TermName>
+          <TermId xmlns="http://schemas.microsoft.com/office/infopath/2007/PartnerControls">de1a6d3c-ac6a-4b34-8edd-308eb81066db</TermId>
+        </TermInfo>
+      </Terms>
+    </BfhIntranetDepartmentText>
+    <QMPilot_DokID xmlns="2551ef7e-3b29-44d1-a8ad-ef34c26bfc60">470</QMPilot_DokID>
+  </documentManagement>
+</p:properties>
 </file>
 
-<file path=customXml/itemProps3.xml><?xml version="1.0" encoding="utf-8"?>
+<file path=customXml/itemProps1.xml><?xml version="1.0" encoding="utf-8"?>
 <ds:datastoreItem xmlns:ds="http://schemas.openxmlformats.org/officeDocument/2006/customXml" ds:itemID="{17412572-CAAE-4A55-B1F7-111B37F547FD}">
   <ds:schemaRefs>
     <ds:schemaRef ds:uri="http://schemas.microsoft.com/office/2006/metadata/contentType"/>
@@ -11725,4 +12444,29 @@
     <ds:schemaRef ds:uri="http://schemas.microsoft.com/internal/obd"/>
   </ds:schemaRefs>
 </ds:datastoreItem>
+</file>
+
+<file path=customXml/itemProps2.xml><?xml version="1.0" encoding="utf-8"?>
+<ds:datastoreItem xmlns:ds="http://schemas.openxmlformats.org/officeDocument/2006/customXml" ds:itemID="{3B108660-2CB9-4BF5-8E68-68C91CE7D9D8}">
+  <ds:schemaRefs>
+    <ds:schemaRef ds:uri="http://schemas.microsoft.com/sharepoint/v3/contenttype/forms"/>
+  </ds:schemaRefs>
+</ds:datastoreItem>
+</file>
+
+<file path=customXml/itemProps3.xml><?xml version="1.0" encoding="utf-8"?>
+<ds:datastoreItem xmlns:ds="http://schemas.openxmlformats.org/officeDocument/2006/customXml" ds:itemID="{C1D1D06F-7B50-4C4E-BDC2-45B577355489}">
+  <ds:schemaRefs>
+    <ds:schemaRef ds:uri="http://purl.org/dc/dcmitype/"/>
+    <ds:schemaRef ds:uri="http://schemas.microsoft.com/office/2006/metadata/properties"/>
+    <ds:schemaRef ds:uri="http://schemas.openxmlformats.org/package/2006/metadata/core-properties"/>
+    <ds:schemaRef ds:uri="http://www.w3.org/XML/1998/namespace"/>
+    <ds:schemaRef ds:uri="2551ef7e-3b29-44d1-a8ad-ef34c26bfc60"/>
+    <ds:schemaRef ds:uri="http://purl.org/dc/elements/1.1/"/>
+    <ds:schemaRef ds:uri="http://schemas.microsoft.com/office/2006/documentManagement/types"/>
+    <ds:schemaRef ds:uri="http://schemas.microsoft.com/office/infopath/2007/PartnerControls"/>
+    <ds:schemaRef ds:uri="f6f68f68-5570-446d-b1e6-2310e70d83d3"/>
+    <ds:schemaRef ds:uri="http://purl.org/dc/terms/"/>
+  </ds:schemaRefs>
+</ds:datastoreItem>
 </file>
</xml_diff>